<commit_message>
updated numbers in chord ring info
</commit_message>
<xml_diff>
--- a/solidworks/smarticle ring/chord ring info.pptx
+++ b/solidworks/smarticle ring/chord ring info.pptx
@@ -3768,7 +3768,7 @@
                 </a14:m>
                 <a:r>
                   <a:rPr lang="en-US" dirty="0" smtClean="0"/>
-                  <a:t>104.18</a:t>
+                  <a:t>104.18g</a:t>
                 </a:r>
               </a:p>
               <a:p>
@@ -3830,7 +3830,7 @@
                 </a14:m>
                 <a:r>
                   <a:rPr lang="en-US" dirty="0" smtClean="0"/>
-                  <a:t>70.72</a:t>
+                  <a:t>70.72g</a:t>
                 </a:r>
                 <a:endParaRPr lang="en-US" dirty="0"/>
               </a:p>

</xml_diff>

<commit_message>
added more solidworks chord files and updated chord calculation document
</commit_message>
<xml_diff>
--- a/solidworks/smarticle ring/chord ring info.pptx
+++ b/solidworks/smarticle ring/chord ring info.pptx
@@ -105,6 +105,11 @@
       </a:defRPr>
     </a:lvl9pPr>
   </p:defaultTextStyle>
+  <p:extLst>
+    <p:ext uri="{EFAFB233-063F-42B5-8137-9DF3F51BA10A}">
+      <p15:sldGuideLst xmlns:p15="http://schemas.microsoft.com/office/powerpoint/2012/main"/>
+    </p:ext>
+  </p:extLst>
 </p:presentation>
 </file>
 
@@ -239,7 +244,7 @@
           <a:p>
             <a:fld id="{C55DCCC7-0CE3-429E-8C4B-4A3DDF06B592}" type="datetimeFigureOut">
               <a:rPr lang="en-US" smtClean="0"/>
-              <a:t>12/13/2017</a:t>
+              <a:t>1/10/2018</a:t>
             </a:fld>
             <a:endParaRPr lang="en-US"/>
           </a:p>
@@ -409,7 +414,7 @@
           <a:p>
             <a:fld id="{C55DCCC7-0CE3-429E-8C4B-4A3DDF06B592}" type="datetimeFigureOut">
               <a:rPr lang="en-US" smtClean="0"/>
-              <a:t>12/13/2017</a:t>
+              <a:t>1/10/2018</a:t>
             </a:fld>
             <a:endParaRPr lang="en-US"/>
           </a:p>
@@ -589,7 +594,7 @@
           <a:p>
             <a:fld id="{C55DCCC7-0CE3-429E-8C4B-4A3DDF06B592}" type="datetimeFigureOut">
               <a:rPr lang="en-US" smtClean="0"/>
-              <a:t>12/13/2017</a:t>
+              <a:t>1/10/2018</a:t>
             </a:fld>
             <a:endParaRPr lang="en-US"/>
           </a:p>
@@ -759,7 +764,7 @@
           <a:p>
             <a:fld id="{C55DCCC7-0CE3-429E-8C4B-4A3DDF06B592}" type="datetimeFigureOut">
               <a:rPr lang="en-US" smtClean="0"/>
-              <a:t>12/13/2017</a:t>
+              <a:t>1/10/2018</a:t>
             </a:fld>
             <a:endParaRPr lang="en-US"/>
           </a:p>
@@ -1005,7 +1010,7 @@
           <a:p>
             <a:fld id="{C55DCCC7-0CE3-429E-8C4B-4A3DDF06B592}" type="datetimeFigureOut">
               <a:rPr lang="en-US" smtClean="0"/>
-              <a:t>12/13/2017</a:t>
+              <a:t>1/10/2018</a:t>
             </a:fld>
             <a:endParaRPr lang="en-US"/>
           </a:p>
@@ -1237,7 +1242,7 @@
           <a:p>
             <a:fld id="{C55DCCC7-0CE3-429E-8C4B-4A3DDF06B592}" type="datetimeFigureOut">
               <a:rPr lang="en-US" smtClean="0"/>
-              <a:t>12/13/2017</a:t>
+              <a:t>1/10/2018</a:t>
             </a:fld>
             <a:endParaRPr lang="en-US"/>
           </a:p>
@@ -1604,7 +1609,7 @@
           <a:p>
             <a:fld id="{C55DCCC7-0CE3-429E-8C4B-4A3DDF06B592}" type="datetimeFigureOut">
               <a:rPr lang="en-US" smtClean="0"/>
-              <a:t>12/13/2017</a:t>
+              <a:t>1/10/2018</a:t>
             </a:fld>
             <a:endParaRPr lang="en-US"/>
           </a:p>
@@ -1722,7 +1727,7 @@
           <a:p>
             <a:fld id="{C55DCCC7-0CE3-429E-8C4B-4A3DDF06B592}" type="datetimeFigureOut">
               <a:rPr lang="en-US" smtClean="0"/>
-              <a:t>12/13/2017</a:t>
+              <a:t>1/10/2018</a:t>
             </a:fld>
             <a:endParaRPr lang="en-US"/>
           </a:p>
@@ -1817,7 +1822,7 @@
           <a:p>
             <a:fld id="{C55DCCC7-0CE3-429E-8C4B-4A3DDF06B592}" type="datetimeFigureOut">
               <a:rPr lang="en-US" smtClean="0"/>
-              <a:t>12/13/2017</a:t>
+              <a:t>1/10/2018</a:t>
             </a:fld>
             <a:endParaRPr lang="en-US"/>
           </a:p>
@@ -2094,7 +2099,7 @@
           <a:p>
             <a:fld id="{C55DCCC7-0CE3-429E-8C4B-4A3DDF06B592}" type="datetimeFigureOut">
               <a:rPr lang="en-US" smtClean="0"/>
-              <a:t>12/13/2017</a:t>
+              <a:t>1/10/2018</a:t>
             </a:fld>
             <a:endParaRPr lang="en-US"/>
           </a:p>
@@ -2347,7 +2352,7 @@
           <a:p>
             <a:fld id="{C55DCCC7-0CE3-429E-8C4B-4A3DDF06B592}" type="datetimeFigureOut">
               <a:rPr lang="en-US" smtClean="0"/>
-              <a:t>12/13/2017</a:t>
+              <a:t>1/10/2018</a:t>
             </a:fld>
             <a:endParaRPr lang="en-US"/>
           </a:p>
@@ -2560,7 +2565,7 @@
           <a:p>
             <a:fld id="{C55DCCC7-0CE3-429E-8C4B-4A3DDF06B592}" type="datetimeFigureOut">
               <a:rPr lang="en-US" smtClean="0"/>
-              <a:t>12/13/2017</a:t>
+              <a:t>1/10/2018</a:t>
             </a:fld>
             <a:endParaRPr lang="en-US"/>
           </a:p>
@@ -3015,8 +3020,8 @@
           </a:prstGeom>
         </p:spPr>
       </p:pic>
-      <mc:AlternateContent xmlns:mc="http://schemas.openxmlformats.org/markup-compatibility/2006">
-        <mc:Choice xmlns:a14="http://schemas.microsoft.com/office/drawing/2010/main" Requires="a14">
+      <mc:AlternateContent xmlns:mc="http://schemas.openxmlformats.org/markup-compatibility/2006" xmlns:a14="http://schemas.microsoft.com/office/drawing/2010/main">
+        <mc:Choice Requires="a14">
           <p:sp>
             <p:nvSpPr>
               <p:cNvPr id="6" name="TextBox 5"/>
@@ -3039,6 +3044,7 @@
               </a:bodyPr>
               <a:lstStyle/>
               <a:p>
+                <a:pPr/>
                 <a14:m>
                   <m:oMathPara xmlns:m="http://schemas.openxmlformats.org/officeDocument/2006/math">
                     <m:oMathParaPr>
@@ -3074,7 +3080,7 @@
                         <a:rPr lang="en-US" b="0" i="1" smtClean="0">
                           <a:latin typeface="Cambria Math" panose="02040503050406030204" pitchFamily="18" charset="0"/>
                         </a:rPr>
-                        <m:t>=46.76</m:t>
+                        <m:t>=46.78</m:t>
                       </m:r>
                       <m:r>
                         <a:rPr lang="en-US" b="0" i="1" smtClean="0">
@@ -3088,6 +3094,7 @@
                 <a:endParaRPr lang="en-US" b="0" dirty="0" smtClean="0"/>
               </a:p>
               <a:p>
+                <a:pPr/>
                 <a14:m>
                   <m:oMathPara xmlns:m="http://schemas.openxmlformats.org/officeDocument/2006/math">
                     <m:oMathParaPr>
@@ -3115,13 +3122,7 @@
                             <a:rPr lang="en-US" b="0" i="1" smtClean="0">
                               <a:latin typeface="Cambria Math" panose="02040503050406030204" pitchFamily="18" charset="0"/>
                             </a:rPr>
-                            <m:t>𝑟𝑖𝑛𝑔</m:t>
-                          </m:r>
-                          <m:r>
-                            <a:rPr lang="en-US" b="0" i="1" smtClean="0">
-                              <a:latin typeface="Cambria Math" panose="02040503050406030204" pitchFamily="18" charset="0"/>
-                            </a:rPr>
-                            <m:t>𝑅𝐿</m:t>
+                            <m:t>𝑟𝑖𝑛𝑔𝑅𝐿</m:t>
                           </m:r>
                         </m:sub>
                       </m:sSub>
@@ -3129,13 +3130,7 @@
                         <a:rPr lang="en-US" b="0" i="1" smtClean="0">
                           <a:latin typeface="Cambria Math" panose="02040503050406030204" pitchFamily="18" charset="0"/>
                         </a:rPr>
-                        <m:t>=</m:t>
-                      </m:r>
-                      <m:r>
-                        <a:rPr lang="en-US" b="0" i="1" smtClean="0">
-                          <a:latin typeface="Cambria Math" panose="02040503050406030204" pitchFamily="18" charset="0"/>
-                        </a:rPr>
-                        <m:t>68.88</m:t>
+                        <m:t>=68.88</m:t>
                       </m:r>
                       <m:r>
                         <a:rPr lang="en-US" b="0" i="1" smtClean="0">
@@ -3152,6 +3147,7 @@
                 <a:endParaRPr lang="en-US" b="1" dirty="0" smtClean="0"/>
               </a:p>
               <a:p>
+                <a:pPr/>
                 <a14:m>
                   <m:oMathPara xmlns:m="http://schemas.openxmlformats.org/officeDocument/2006/math">
                     <m:oMathParaPr>
@@ -3201,6 +3197,7 @@
                 <a:endParaRPr lang="en-US" b="0" dirty="0" smtClean="0"/>
               </a:p>
               <a:p>
+                <a:pPr/>
                 <a14:m>
                   <m:oMathPara xmlns:m="http://schemas.openxmlformats.org/officeDocument/2006/math">
                     <m:oMathParaPr>
@@ -3252,7 +3249,7 @@
             </p:txBody>
           </p:sp>
         </mc:Choice>
-        <mc:Fallback>
+        <mc:Fallback xmlns="">
           <p:sp>
             <p:nvSpPr>
               <p:cNvPr id="6" name="TextBox 5"/>
@@ -3603,7 +3600,7 @@
           <a:p>
             <a:r>
               <a:rPr lang="en-US" b="1" dirty="0" smtClean="0"/>
-              <a:t>This must weight smarticle + 26.53% of old ring </a:t>
+              <a:t>This must be weight of  smarticle + 26.53% of old ring </a:t>
             </a:r>
             <a:endParaRPr lang="en-US" b="1" dirty="0"/>
           </a:p>
@@ -3639,8 +3636,8 @@
           </a:p>
         </p:txBody>
       </p:sp>
-      <mc:AlternateContent xmlns:mc="http://schemas.openxmlformats.org/markup-compatibility/2006">
-        <mc:Choice xmlns:a14="http://schemas.microsoft.com/office/drawing/2010/main" Requires="a14">
+      <mc:AlternateContent xmlns:mc="http://schemas.openxmlformats.org/markup-compatibility/2006" xmlns:a14="http://schemas.microsoft.com/office/drawing/2010/main">
+        <mc:Choice Requires="a14">
           <p:sp>
             <p:nvSpPr>
               <p:cNvPr id="8" name="TextBox 7"/>
@@ -3775,6 +3772,7 @@
                 <a:endParaRPr lang="en-US" dirty="0"/>
               </a:p>
               <a:p>
+                <a:pPr/>
                 <a14:m>
                   <m:oMathPara xmlns:m="http://schemas.openxmlformats.org/officeDocument/2006/math">
                     <m:oMathParaPr>
@@ -3837,7 +3835,7 @@
             </p:txBody>
           </p:sp>
         </mc:Choice>
-        <mc:Fallback>
+        <mc:Fallback xmlns="">
           <p:sp>
             <p:nvSpPr>
               <p:cNvPr id="8" name="TextBox 7"/>
@@ -3858,6 +3856,95 @@
                 <a:blip r:embed="rId3"/>
                 <a:stretch>
                   <a:fillRect l="-1541" t="-2062" b="-4811"/>
+                </a:stretch>
+              </a:blipFill>
+            </p:spPr>
+            <p:txBody>
+              <a:bodyPr/>
+              <a:lstStyle/>
+              <a:p>
+                <a:r>
+                  <a:rPr lang="en-US">
+                    <a:noFill/>
+                  </a:rPr>
+                  <a:t> </a:t>
+                </a:r>
+              </a:p>
+            </p:txBody>
+          </p:sp>
+        </mc:Fallback>
+      </mc:AlternateContent>
+      <mc:AlternateContent xmlns:mc="http://schemas.openxmlformats.org/markup-compatibility/2006">
+        <mc:Choice xmlns:a14="http://schemas.microsoft.com/office/drawing/2010/main" Requires="a14">
+          <p:sp>
+            <p:nvSpPr>
+              <p:cNvPr id="3" name="TextBox 2"/>
+              <p:cNvSpPr txBox="1"/>
+              <p:nvPr/>
+            </p:nvSpPr>
+            <p:spPr>
+              <a:xfrm>
+                <a:off x="8520056" y="2261969"/>
+                <a:ext cx="623944" cy="369332"/>
+              </a:xfrm>
+              <a:prstGeom prst="rect">
+                <a:avLst/>
+              </a:prstGeom>
+              <a:noFill/>
+            </p:spPr>
+            <p:txBody>
+              <a:bodyPr wrap="square" rtlCol="0">
+                <a:spAutoFit/>
+              </a:bodyPr>
+              <a:lstStyle/>
+              <a:p>
+                <a14:m>
+                  <m:oMathPara xmlns:m="http://schemas.openxmlformats.org/officeDocument/2006/math">
+                    <m:oMathParaPr>
+                      <m:jc m:val="centerGroup"/>
+                    </m:oMathParaPr>
+                    <m:oMath xmlns:m="http://schemas.openxmlformats.org/officeDocument/2006/math">
+                      <m:r>
+                        <a:rPr lang="en-US" b="0" i="0" smtClean="0">
+                          <a:latin typeface="Cambria Math" panose="02040503050406030204" pitchFamily="18" charset="0"/>
+                        </a:rPr>
+                        <m:t>251</m:t>
+                      </m:r>
+                      <m:r>
+                        <a:rPr lang="en-US" b="0" i="1" smtClean="0">
+                          <a:latin typeface="Cambria Math" panose="02040503050406030204" pitchFamily="18" charset="0"/>
+                        </a:rPr>
+                        <m:t>°</m:t>
+                      </m:r>
+                    </m:oMath>
+                  </m:oMathPara>
+                </a14:m>
+                <a:endParaRPr lang="en-US" dirty="0"/>
+              </a:p>
+            </p:txBody>
+          </p:sp>
+        </mc:Choice>
+        <mc:Fallback>
+          <p:sp>
+            <p:nvSpPr>
+              <p:cNvPr id="3" name="TextBox 2"/>
+              <p:cNvSpPr txBox="1">
+                <a:spLocks noRot="1" noChangeAspect="1" noMove="1" noResize="1" noEditPoints="1" noAdjustHandles="1" noChangeArrowheads="1" noChangeShapeType="1" noTextEdit="1"/>
+              </p:cNvSpPr>
+              <p:nvPr/>
+            </p:nvSpPr>
+            <p:spPr>
+              <a:xfrm>
+                <a:off x="8520056" y="2261969"/>
+                <a:ext cx="623944" cy="369332"/>
+              </a:xfrm>
+              <a:prstGeom prst="rect">
+                <a:avLst/>
+              </a:prstGeom>
+              <a:blipFill rotWithShape="0">
+                <a:blip r:embed="rId4"/>
+                <a:stretch>
+                  <a:fillRect r="-2941"/>
                 </a:stretch>
               </a:blipFill>
             </p:spPr>

</xml_diff>